<commit_message>
Apply template pattern to compound shapes
</commit_message>
<xml_diff>
--- a/CPS.pptx
+++ b/CPS.pptx
@@ -7,8 +7,8 @@
   <p:sldIdLst>
     <p:sldId id="256" r:id="rId2"/>
     <p:sldId id="257" r:id="rId3"/>
-    <p:sldId id="261" r:id="rId4"/>
-    <p:sldId id="258" r:id="rId5"/>
+    <p:sldId id="258" r:id="rId4"/>
+    <p:sldId id="261" r:id="rId5"/>
     <p:sldId id="259" r:id="rId6"/>
     <p:sldId id="260" r:id="rId7"/>
   </p:sldIdLst>
@@ -6031,7 +6031,7 @@
           <p:cNvPr id="2" name="Title 1">
             <a:extLst>
               <a:ext uri="{FF2B5EF4-FFF2-40B4-BE49-F238E27FC236}">
-                <a16:creationId xmlns:a16="http://schemas.microsoft.com/office/drawing/2014/main" id="{433AC802-4258-4837-AF54-3B9722936DA8}"/>
+                <a16:creationId xmlns:a16="http://schemas.microsoft.com/office/drawing/2014/main" id="{3998AD56-9DB1-4E1D-9C62-CDF455EFCCE6}"/>
               </a:ext>
             </a:extLst>
           </p:cNvPr>
@@ -6049,7 +6049,7 @@
           <a:p>
             <a:r>
               <a:rPr lang="en-US" dirty="0"/>
-              <a:t>Structure</a:t>
+              <a:t>Test Driven Development</a:t>
             </a:r>
           </a:p>
         </p:txBody>
@@ -6059,7 +6059,7 @@
           <p:cNvPr id="3" name="Content Placeholder 2">
             <a:extLst>
               <a:ext uri="{FF2B5EF4-FFF2-40B4-BE49-F238E27FC236}">
-                <a16:creationId xmlns:a16="http://schemas.microsoft.com/office/drawing/2014/main" id="{470ED478-452D-474B-8FF4-A9370B5B7687}"/>
+                <a16:creationId xmlns:a16="http://schemas.microsoft.com/office/drawing/2014/main" id="{B1FF1BFA-AA95-41C9-BF59-66822754967A}"/>
               </a:ext>
             </a:extLst>
           </p:cNvPr>
@@ -6077,14 +6077,13 @@
           <a:p>
             <a:r>
               <a:rPr lang="en-US" dirty="0"/>
-              <a:t>We used polymorphism with a base shape class.</a:t>
-            </a:r>
-          </a:p>
-          <a:p>
-            <a:pPr lvl="1"/>
+              <a:t>We used catch but we wrote many of the tests after the fact, so it was not true TDD.</a:t>
+            </a:r>
+          </a:p>
+          <a:p>
             <a:r>
               <a:rPr lang="en-US" dirty="0"/>
-              <a:t>Derived basic and compound shape classes</a:t>
+              <a:t>We tested PS output visually (with our eyes not computer vision).</a:t>
             </a:r>
           </a:p>
         </p:txBody>
@@ -6092,7 +6091,7 @@
     </p:spTree>
     <p:extLst>
       <p:ext uri="{BB962C8B-B14F-4D97-AF65-F5344CB8AC3E}">
-        <p14:creationId xmlns:p14="http://schemas.microsoft.com/office/powerpoint/2010/main" val="3891985695"/>
+        <p14:creationId xmlns:p14="http://schemas.microsoft.com/office/powerpoint/2010/main" val="845379722"/>
       </p:ext>
     </p:extLst>
   </p:cSld>
@@ -6124,7 +6123,7 @@
           <p:cNvPr id="2" name="Title 1">
             <a:extLst>
               <a:ext uri="{FF2B5EF4-FFF2-40B4-BE49-F238E27FC236}">
-                <a16:creationId xmlns:a16="http://schemas.microsoft.com/office/drawing/2014/main" id="{3998AD56-9DB1-4E1D-9C62-CDF455EFCCE6}"/>
+                <a16:creationId xmlns:a16="http://schemas.microsoft.com/office/drawing/2014/main" id="{433AC802-4258-4837-AF54-3B9722936DA8}"/>
               </a:ext>
             </a:extLst>
           </p:cNvPr>
@@ -6142,7 +6141,7 @@
           <a:p>
             <a:r>
               <a:rPr lang="en-US" dirty="0"/>
-              <a:t>Test Driven Development</a:t>
+              <a:t>Structure</a:t>
             </a:r>
           </a:p>
         </p:txBody>
@@ -6152,7 +6151,7 @@
           <p:cNvPr id="3" name="Content Placeholder 2">
             <a:extLst>
               <a:ext uri="{FF2B5EF4-FFF2-40B4-BE49-F238E27FC236}">
-                <a16:creationId xmlns:a16="http://schemas.microsoft.com/office/drawing/2014/main" id="{B1FF1BFA-AA95-41C9-BF59-66822754967A}"/>
+                <a16:creationId xmlns:a16="http://schemas.microsoft.com/office/drawing/2014/main" id="{470ED478-452D-474B-8FF4-A9370B5B7687}"/>
               </a:ext>
             </a:extLst>
           </p:cNvPr>
@@ -6170,13 +6169,14 @@
           <a:p>
             <a:r>
               <a:rPr lang="en-US" dirty="0"/>
-              <a:t>We used catch but we wrote many of the tests after the fact, so it was not true TDD.</a:t>
-            </a:r>
-          </a:p>
-          <a:p>
+              <a:t>We used polymorphism with a base shape class.</a:t>
+            </a:r>
+          </a:p>
+          <a:p>
+            <a:pPr lvl="1"/>
             <a:r>
               <a:rPr lang="en-US" dirty="0"/>
-              <a:t>We tested PS output visually (with our eyes not computer vision).</a:t>
+              <a:t>Derived basic and compound shape classes</a:t>
             </a:r>
           </a:p>
         </p:txBody>
@@ -6184,7 +6184,7 @@
     </p:spTree>
     <p:extLst>
       <p:ext uri="{BB962C8B-B14F-4D97-AF65-F5344CB8AC3E}">
-        <p14:creationId xmlns:p14="http://schemas.microsoft.com/office/powerpoint/2010/main" val="845379722"/>
+        <p14:creationId xmlns:p14="http://schemas.microsoft.com/office/powerpoint/2010/main" val="3891985695"/>
       </p:ext>
     </p:extLst>
   </p:cSld>

</xml_diff>